<commit_message>
Se añadió la presentación 2 y el Informe 2, falta el Código 2
</commit_message>
<xml_diff>
--- a/Proyecto/Presentaciones/Presentacion2.pptx
+++ b/Proyecto/Presentaciones/Presentacion2.pptx
@@ -251,7 +251,7 @@
       <p15:sldGuideLst xmlns:p15="http://schemas.microsoft.com/office/powerpoint/2012/main"/>
     </p:ext>
     <p:ext uri="http://customooxmlschemas.google.com/">
-      <go:slidesCustomData xmlns="" xmlns:mc="http://schemas.openxmlformats.org/markup-compatibility/2006" xmlns:mv="urn:schemas-microsoft-com:mac:vml" xmlns:c="http://schemas.openxmlformats.org/drawingml/2006/chart" xmlns:dgm="http://schemas.openxmlformats.org/drawingml/2006/diagram" xmlns:o="urn:schemas-microsoft-com:office:office" xmlns:v="urn:schemas-microsoft-com:vml" xmlns:pvml="urn:schemas-microsoft-com:office:powerpoint" xmlns:com="http://schemas.openxmlformats.org/drawingml/2006/compatibility" xmlns:p14="http://schemas.microsoft.com/office/powerpoint/2010/main" xmlns:p15="http://schemas.microsoft.com/office/powerpoint/2012/main" xmlns:ahyp="http://schemas.microsoft.com/office/drawing/2018/hyperlinkcolor" xmlns:go="http://customooxmlschemas.google.com/" r:id="rId21" roundtripDataSignature="AMtx7mjHzTg+goWcQk8fO5It0l+0ng5KHA=="/>
+      <go:slidesCustomData xmlns:go="http://customooxmlschemas.google.com/" xmlns:ahyp="http://schemas.microsoft.com/office/drawing/2018/hyperlinkcolor" xmlns:p15="http://schemas.microsoft.com/office/powerpoint/2012/main" xmlns:p14="http://schemas.microsoft.com/office/powerpoint/2010/main" xmlns:com="http://schemas.openxmlformats.org/drawingml/2006/compatibility" xmlns:pvml="urn:schemas-microsoft-com:office:powerpoint" xmlns:v="urn:schemas-microsoft-com:vml" xmlns:o="urn:schemas-microsoft-com:office:office" xmlns:dgm="http://schemas.openxmlformats.org/drawingml/2006/diagram" xmlns:c="http://schemas.openxmlformats.org/drawingml/2006/chart" xmlns:mv="urn:schemas-microsoft-com:mac:vml" xmlns:mc="http://schemas.openxmlformats.org/markup-compatibility/2006" xmlns="" r:id="rId21" roundtripDataSignature="AMtx7mjHzTg+goWcQk8fO5It0l+0ng5KHA=="/>
     </p:ext>
   </p:extLst>
 </p:presentation>
@@ -17103,7 +17103,11 @@
             </a:pPr>
             <a:r>
               <a:rPr lang="es-ES" sz="3600" b="1" dirty="0"/>
-              <a:t>Compresión y análisis de imágenes por medio de algoritmos.</a:t>
+              <a:t>Compresión y análisis de imágenes por medio de </a:t>
+            </a:r>
+            <a:r>
+              <a:rPr lang="es-ES" sz="3600" b="1"/>
+              <a:t>algoritmos. </a:t>
             </a:r>
             <a:endParaRPr sz="3600" b="0" i="0" u="none" strike="noStrike" cap="none" dirty="0">
               <a:solidFill>

</xml_diff>

<commit_message>
Se añadió el Informe 2, la Presentación 2 y el Código 2
</commit_message>
<xml_diff>
--- a/Proyecto/Presentaciones/Presentacion2.pptx
+++ b/Proyecto/Presentaciones/Presentacion2.pptx
@@ -251,7 +251,7 @@
       <p15:sldGuideLst xmlns:p15="http://schemas.microsoft.com/office/powerpoint/2012/main"/>
     </p:ext>
     <p:ext uri="http://customooxmlschemas.google.com/">
-      <go:slidesCustomData xmlns:go="http://customooxmlschemas.google.com/" xmlns:ahyp="http://schemas.microsoft.com/office/drawing/2018/hyperlinkcolor" xmlns:p15="http://schemas.microsoft.com/office/powerpoint/2012/main" xmlns:p14="http://schemas.microsoft.com/office/powerpoint/2010/main" xmlns:com="http://schemas.openxmlformats.org/drawingml/2006/compatibility" xmlns:pvml="urn:schemas-microsoft-com:office:powerpoint" xmlns:v="urn:schemas-microsoft-com:vml" xmlns:o="urn:schemas-microsoft-com:office:office" xmlns:dgm="http://schemas.openxmlformats.org/drawingml/2006/diagram" xmlns:c="http://schemas.openxmlformats.org/drawingml/2006/chart" xmlns:mv="urn:schemas-microsoft-com:mac:vml" xmlns:mc="http://schemas.openxmlformats.org/markup-compatibility/2006" xmlns="" r:id="rId21" roundtripDataSignature="AMtx7mjHzTg+goWcQk8fO5It0l+0ng5KHA=="/>
+      <go:slidesCustomData xmlns="" xmlns:mc="http://schemas.openxmlformats.org/markup-compatibility/2006" xmlns:mv="urn:schemas-microsoft-com:mac:vml" xmlns:c="http://schemas.openxmlformats.org/drawingml/2006/chart" xmlns:dgm="http://schemas.openxmlformats.org/drawingml/2006/diagram" xmlns:o="urn:schemas-microsoft-com:office:office" xmlns:v="urn:schemas-microsoft-com:vml" xmlns:pvml="urn:schemas-microsoft-com:office:powerpoint" xmlns:com="http://schemas.openxmlformats.org/drawingml/2006/compatibility" xmlns:p14="http://schemas.microsoft.com/office/powerpoint/2010/main" xmlns:p15="http://schemas.microsoft.com/office/powerpoint/2012/main" xmlns:ahyp="http://schemas.microsoft.com/office/drawing/2018/hyperlinkcolor" xmlns:go="http://customooxmlschemas.google.com/" r:id="rId21" roundtripDataSignature="AMtx7mjHzTg+goWcQk8fO5It0l+0ng5KHA=="/>
     </p:ext>
   </p:extLst>
 </p:presentation>
@@ -17103,11 +17103,7 @@
             </a:pPr>
             <a:r>
               <a:rPr lang="es-ES" sz="3600" b="1" dirty="0"/>
-              <a:t>Compresión y análisis de imágenes por medio de </a:t>
-            </a:r>
-            <a:r>
-              <a:rPr lang="es-ES" sz="3600" b="1"/>
-              <a:t>algoritmos. </a:t>
+              <a:t>Compresión y análisis de imágenes por medio de algoritmos. </a:t>
             </a:r>
             <a:endParaRPr sz="3600" b="0" i="0" u="none" strike="noStrike" cap="none" dirty="0">
               <a:solidFill>
@@ -17631,7 +17627,7 @@
         <p:spPr>
           <a:xfrm>
             <a:off x="815040" y="6160680"/>
-            <a:ext cx="9867614" cy="429433"/>
+            <a:ext cx="9867614" cy="414044"/>
           </a:xfrm>
           <a:prstGeom prst="rect">
             <a:avLst/>
@@ -17647,86 +17643,24 @@
           </a:bodyPr>
           <a:lstStyle/>
           <a:p>
-            <a:pPr marL="0" marR="0" lvl="0" indent="0" algn="l" rtl="0">
-              <a:lnSpc>
-                <a:spcPct val="100000"/>
-              </a:lnSpc>
-              <a:spcBef>
-                <a:spcPts val="0"/>
-              </a:spcBef>
-              <a:spcAft>
-                <a:spcPts val="0"/>
-              </a:spcAft>
-              <a:buClr>
-                <a:srgbClr val="000000"/>
-              </a:buClr>
+            <a:pPr lvl="0">
               <a:buSzPts val="2200"/>
-              <a:buFont typeface="Arial"/>
-              <a:buNone/>
             </a:pPr>
             <a:r>
-              <a:rPr lang="en-US" sz="2200" b="1" i="0" u="none" strike="noStrike" cap="none" dirty="0">
+              <a:rPr lang="en-US" sz="2100" b="1" dirty="0">
                 <a:solidFill>
                   <a:srgbClr val="001E33"/>
                 </a:solidFill>
                 <a:uFill>
                   <a:noFill/>
                 </a:uFill>
-                <a:sym typeface="Arial"/>
-                <a:hlinkClick r:id="rId6">
-                  <a:extLst>
-                    <a:ext uri="{A12FA001-AC4F-418D-AE19-62706E023703}">
-                      <ahyp:hlinkClr xmlns:ahyp="http://schemas.microsoft.com/office/drawing/2018/hyperlinkcolor" val="tx"/>
-                    </a:ext>
-                  </a:extLst>
-                </a:hlinkClick>
               </a:rPr>
-              <a:t>http://github.com/DavidAgudeloTapias/ST0245-001/</a:t>
+              <a:t>https://github.com/DavidAgudeloTapias/ST0245-001/tree/master/Proyecto</a:t>
             </a:r>
-            <a:r>
-              <a:rPr lang="en-US" sz="2200" b="1" dirty="0">
-                <a:solidFill>
-                  <a:srgbClr val="001E33"/>
-                </a:solidFill>
-                <a:uFill>
-                  <a:noFill/>
-                </a:uFill>
-                <a:hlinkClick r:id="rId6">
-                  <a:extLst>
-                    <a:ext uri="{A12FA001-AC4F-418D-AE19-62706E023703}">
-                      <ahyp:hlinkClr xmlns:ahyp="http://schemas.microsoft.com/office/drawing/2018/hyperlinkcolor" val="tx"/>
-                    </a:ext>
-                  </a:extLst>
-                </a:hlinkClick>
-              </a:rPr>
-              <a:t>P</a:t>
-            </a:r>
-            <a:r>
-              <a:rPr lang="en-US" sz="2200" b="1" i="0" u="none" strike="noStrike" cap="none" dirty="0">
-                <a:solidFill>
-                  <a:srgbClr val="001E33"/>
-                </a:solidFill>
-                <a:uFill>
-                  <a:noFill/>
-                </a:uFill>
-                <a:sym typeface="Arial"/>
-                <a:hlinkClick r:id="rId6">
-                  <a:extLst>
-                    <a:ext uri="{A12FA001-AC4F-418D-AE19-62706E023703}">
-                      <ahyp:hlinkClr xmlns:ahyp="http://schemas.microsoft.com/office/drawing/2018/hyperlinkcolor" val="tx"/>
-                    </a:ext>
-                  </a:extLst>
-                </a:hlinkClick>
-              </a:rPr>
-              <a:t>royecto/</a:t>
-            </a:r>
-            <a:endParaRPr sz="2200" b="1" i="0" u="none" strike="noStrike" cap="none" dirty="0">
+            <a:endParaRPr sz="2100" b="1" i="0" u="none" strike="noStrike" cap="none" dirty="0">
               <a:solidFill>
                 <a:srgbClr val="001E33"/>
               </a:solidFill>
-              <a:latin typeface="Arial"/>
-              <a:ea typeface="Arial"/>
-              <a:cs typeface="Arial"/>
               <a:sym typeface="Arial"/>
             </a:endParaRPr>
           </a:p>
@@ -17753,7 +17687,7 @@
             <p:nvPr/>
           </p:nvPicPr>
           <p:blipFill rotWithShape="1">
-            <a:blip r:embed="rId7">
+            <a:blip r:embed="rId6">
               <a:alphaModFix/>
             </a:blip>
             <a:srcRect l="2186" t="17695" r="15575" b="26359"/>
@@ -18333,7 +18267,7 @@
           <p:nvPr/>
         </p:nvPicPr>
         <p:blipFill rotWithShape="1">
-          <a:blip r:embed="rId8"/>
+          <a:blip r:embed="rId7"/>
           <a:srcRect b="15917"/>
           <a:stretch/>
         </p:blipFill>
@@ -18736,7 +18670,7 @@
               <a:buNone/>
             </a:pPr>
             <a:r>
-              <a:rPr lang="en-US" sz="2200" b="1" i="0" u="none" strike="noStrike" cap="none">
+              <a:rPr lang="en-US" sz="2200" b="1" i="0" u="none" strike="noStrike" cap="none" dirty="0">
                 <a:solidFill>
                   <a:srgbClr val="001E33"/>
                 </a:solidFill>
@@ -18747,7 +18681,7 @@
               </a:rPr>
               <a:t>Imágenes de ganado enfermo</a:t>
             </a:r>
-            <a:endParaRPr sz="2200" b="1" i="0" u="none" strike="noStrike" cap="none">
+            <a:endParaRPr sz="2200" b="1" i="0" u="none" strike="noStrike" cap="none" dirty="0">
               <a:solidFill>
                 <a:srgbClr val="001E33"/>
               </a:solidFill>
@@ -18775,7 +18709,7 @@
               <a:buFont typeface="Arial"/>
               <a:buNone/>
             </a:pPr>
-            <a:endParaRPr sz="2200" b="0" i="0" u="none" strike="noStrike" cap="none">
+            <a:endParaRPr sz="2200" b="0" i="0" u="none" strike="noStrike" cap="none" dirty="0">
               <a:solidFill>
                 <a:srgbClr val="001E33"/>
               </a:solidFill>
@@ -18830,7 +18764,7 @@
               <a:buNone/>
             </a:pPr>
             <a:r>
-              <a:rPr lang="en-US" sz="2200" b="1" i="0" u="none" strike="noStrike" cap="none">
+              <a:rPr lang="en-US" sz="2200" b="1" i="0" u="none" strike="noStrike" cap="none" dirty="0">
                 <a:solidFill>
                   <a:srgbClr val="0563C1"/>
                 </a:solidFill>
@@ -18841,7 +18775,7 @@
               </a:rPr>
               <a:t>Imágenes del ganado sano</a:t>
             </a:r>
-            <a:endParaRPr sz="2200" b="1" i="0" u="none" strike="noStrike" cap="none">
+            <a:endParaRPr sz="2200" b="1" i="0" u="none" strike="noStrike" cap="none" dirty="0">
               <a:solidFill>
                 <a:srgbClr val="0563C1"/>
               </a:solidFill>
@@ -18869,7 +18803,7 @@
               <a:buFont typeface="Arial"/>
               <a:buNone/>
             </a:pPr>
-            <a:endParaRPr sz="2200" b="0" i="0" u="none" strike="noStrike" cap="none">
+            <a:endParaRPr sz="2200" b="0" i="0" u="none" strike="noStrike" cap="none" dirty="0">
               <a:solidFill>
                 <a:srgbClr val="001E33"/>
               </a:solidFill>
@@ -20247,8 +20181,8 @@
         </p:nvSpPr>
         <p:spPr>
           <a:xfrm>
-            <a:off x="-86013" y="4166075"/>
-            <a:ext cx="3544500" cy="759900"/>
+            <a:off x="206059" y="4409116"/>
+            <a:ext cx="2821429" cy="458994"/>
           </a:xfrm>
           <a:prstGeom prst="rect">
             <a:avLst/>
@@ -20291,19 +20225,7 @@
                 <a:cs typeface="Arial"/>
                 <a:sym typeface="Arial"/>
               </a:rPr>
-              <a:t>Imagen del </a:t>
-            </a:r>
-            <a:r>
-              <a:rPr lang="en-US" sz="2200" b="1" i="0" u="none" strike="noStrike" cap="none" dirty="0" err="1">
-                <a:solidFill>
-                  <a:srgbClr val="001E33"/>
-                </a:solidFill>
-                <a:latin typeface="Arial"/>
-                <a:ea typeface="Arial"/>
-                <a:cs typeface="Arial"/>
-                <a:sym typeface="Arial"/>
-              </a:rPr>
-              <a:t>ganado</a:t>
+              <a:t>Imagen del ganado</a:t>
             </a:r>
             <a:endParaRPr sz="2200" b="1" i="0" u="none" strike="noStrike" cap="none" dirty="0">
               <a:solidFill>
@@ -21267,8 +21189,8 @@
         </p:nvSpPr>
         <p:spPr>
           <a:xfrm>
-            <a:off x="2925087" y="4106275"/>
-            <a:ext cx="3544500" cy="759900"/>
+            <a:off x="3236426" y="4258663"/>
+            <a:ext cx="3204447" cy="759900"/>
           </a:xfrm>
           <a:prstGeom prst="rect">
             <a:avLst/>
@@ -21302,6 +21224,18 @@
               <a:buNone/>
             </a:pPr>
             <a:r>
+              <a:rPr lang="es-CO" sz="2200" b="1" i="0" u="none" strike="noStrike" cap="none" dirty="0" smtClean="0">
+                <a:solidFill>
+                  <a:srgbClr val="001E33"/>
+                </a:solidFill>
+                <a:latin typeface="Arial"/>
+                <a:ea typeface="Arial"/>
+                <a:cs typeface="Arial"/>
+                <a:sym typeface="Arial"/>
+              </a:rPr>
+              <a:t>Interpolación del vecino </a:t>
+            </a:r>
+            <a:r>
               <a:rPr lang="es-CO" sz="2200" b="1" i="0" u="none" strike="noStrike" cap="none" dirty="0">
                 <a:solidFill>
                   <a:srgbClr val="001E33"/>
@@ -21311,7 +21245,19 @@
                 <a:cs typeface="Arial"/>
                 <a:sym typeface="Arial"/>
               </a:rPr>
-              <a:t>KNN vecinos más cercanos</a:t>
+              <a:t>más </a:t>
+            </a:r>
+            <a:r>
+              <a:rPr lang="es-CO" sz="2200" b="1" i="0" u="none" strike="noStrike" cap="none" dirty="0" smtClean="0">
+                <a:solidFill>
+                  <a:srgbClr val="001E33"/>
+                </a:solidFill>
+                <a:latin typeface="Arial"/>
+                <a:ea typeface="Arial"/>
+                <a:cs typeface="Arial"/>
+                <a:sym typeface="Arial"/>
+              </a:rPr>
+              <a:t>cercano</a:t>
             </a:r>
             <a:endParaRPr sz="2200" b="1" i="0" u="none" strike="noStrike" cap="none" dirty="0">
               <a:solidFill>
@@ -21595,7 +21541,7 @@
               <a:buNone/>
             </a:pPr>
             <a:r>
-              <a:rPr lang="en-US" sz="2100" b="1" i="0" u="none" strike="noStrike" cap="none">
+              <a:rPr lang="en-US" sz="2100" b="1" i="0" u="none" strike="noStrike" cap="none" dirty="0" err="1">
                 <a:solidFill>
                   <a:srgbClr val="00AADB"/>
                 </a:solidFill>
@@ -21604,9 +21550,21 @@
                 <a:cs typeface="Arial"/>
                 <a:sym typeface="Arial"/>
               </a:rPr>
-              <a:t>Está enfermo</a:t>
+              <a:t>Está</a:t>
             </a:r>
-            <a:endParaRPr sz="2100" b="1" i="0" u="none" strike="noStrike" cap="none">
+            <a:r>
+              <a:rPr lang="en-US" sz="2100" b="1" i="0" u="none" strike="noStrike" cap="none" dirty="0">
+                <a:solidFill>
+                  <a:srgbClr val="00AADB"/>
+                </a:solidFill>
+                <a:latin typeface="Arial"/>
+                <a:ea typeface="Arial"/>
+                <a:cs typeface="Arial"/>
+                <a:sym typeface="Arial"/>
+              </a:rPr>
+              <a:t> enfermo</a:t>
+            </a:r>
+            <a:endParaRPr sz="2100" b="1" i="0" u="none" strike="noStrike" cap="none" dirty="0">
               <a:solidFill>
                 <a:srgbClr val="00AADB"/>
               </a:solidFill>
@@ -21626,8 +21584,8 @@
         </p:nvSpPr>
         <p:spPr>
           <a:xfrm>
-            <a:off x="8411487" y="4258675"/>
-            <a:ext cx="3544500" cy="759900"/>
+            <a:off x="9851747" y="4425306"/>
+            <a:ext cx="1371605" cy="426613"/>
           </a:xfrm>
           <a:prstGeom prst="rect">
             <a:avLst/>
@@ -21661,7 +21619,7 @@
               <a:buNone/>
             </a:pPr>
             <a:r>
-              <a:rPr lang="en-US" sz="2200" b="1" i="0" u="none" strike="noStrike" cap="none">
+              <a:rPr lang="en-US" sz="2200" b="1" i="0" u="none" strike="noStrike" cap="none" dirty="0">
                 <a:solidFill>
                   <a:srgbClr val="001E33"/>
                 </a:solidFill>
@@ -21672,7 +21630,7 @@
               </a:rPr>
               <a:t>Salida</a:t>
             </a:r>
-            <a:endParaRPr sz="2200" b="1" i="0" u="none" strike="noStrike" cap="none">
+            <a:endParaRPr sz="2200" b="1" i="0" u="none" strike="noStrike" cap="none" dirty="0">
               <a:solidFill>
                 <a:srgbClr val="001E33"/>
               </a:solidFill>
@@ -21700,7 +21658,7 @@
               <a:buFont typeface="Arial"/>
               <a:buNone/>
             </a:pPr>
-            <a:endParaRPr sz="2200" b="0" i="0" u="none" strike="noStrike" cap="none">
+            <a:endParaRPr sz="2200" b="0" i="0" u="none" strike="noStrike" cap="none" dirty="0">
               <a:solidFill>
                 <a:srgbClr val="001E33"/>
               </a:solidFill>
@@ -21838,8 +21796,8 @@
         </p:nvSpPr>
         <p:spPr>
           <a:xfrm>
-            <a:off x="162000" y="4943951"/>
-            <a:ext cx="6307500" cy="952653"/>
+            <a:off x="130084" y="4549813"/>
+            <a:ext cx="11930152" cy="1383540"/>
           </a:xfrm>
           <a:prstGeom prst="rect">
             <a:avLst/>
@@ -21882,7 +21840,52 @@
                 <a:cs typeface="Arial"/>
                 <a:sym typeface="Arial"/>
               </a:rPr>
-              <a:t>Lo que hace el algoritmo de KNN vecinos más cercanos es tomar un valor común o un valor que represente a un conjunto de N número de pixeles, y de esta manera comprimir la imagen y que no sea tan pesada, para que al momento de ejecutar el código, sea más eficaz.</a:t>
+              <a:t>Lo que hace el algoritmo de KNN vecinos más cercanos es tomar un valor común o un valor que represente a un conjunto de N número de pixeles, y de esta manera comprimir la imagen y que no sea tan pesada, para que al momento de ejecutar el código, sea más eficaz</a:t>
+            </a:r>
+            <a:r>
+              <a:rPr lang="es-CO" sz="1400" b="0" i="0" u="none" strike="noStrike" cap="none" dirty="0" smtClean="0">
+                <a:solidFill>
+                  <a:srgbClr val="000000"/>
+                </a:solidFill>
+                <a:latin typeface="Arial"/>
+                <a:ea typeface="Arial"/>
+                <a:cs typeface="Arial"/>
+                <a:sym typeface="Arial"/>
+              </a:rPr>
+              <a:t>.</a:t>
+            </a:r>
+          </a:p>
+          <a:p>
+            <a:pPr marL="0" marR="0" lvl="0" indent="0" algn="l" rtl="0">
+              <a:lnSpc>
+                <a:spcPct val="100000"/>
+              </a:lnSpc>
+              <a:spcBef>
+                <a:spcPts val="0"/>
+              </a:spcBef>
+              <a:spcAft>
+                <a:spcPts val="0"/>
+              </a:spcAft>
+              <a:buClr>
+                <a:srgbClr val="000000"/>
+              </a:buClr>
+              <a:buSzPts val="1400"/>
+              <a:buFont typeface="Arial"/>
+              <a:buNone/>
+            </a:pPr>
+            <a:endParaRPr lang="es-CO" dirty="0"/>
+          </a:p>
+          <a:p>
+            <a:pPr lvl="0">
+              <a:buSzPts val="1400"/>
+            </a:pPr>
+            <a:r>
+              <a:rPr lang="es-ES" dirty="0"/>
+              <a:t>Cuando el método de interpolación del vecino más cercano agranda la imagen, el píxel agregado es el valor del píxel del vecino más cercano. Debido a que el método es simple, la velocidad de procesamiento es muy rápida, pero la calidad de imagen de la imagen ampliada se deteriora significativamente y a menudo contiene bordes </a:t>
+            </a:r>
+            <a:r>
+              <a:rPr lang="es-ES" dirty="0" smtClean="0"/>
+              <a:t>irregulares.</a:t>
             </a:r>
             <a:endParaRPr sz="1400" b="0" i="0" u="none" strike="noStrike" cap="none" dirty="0">
               <a:solidFill>
@@ -21925,7 +21928,7 @@
         </p:blipFill>
         <p:spPr bwMode="auto">
           <a:xfrm>
-            <a:off x="7898642" y="1724628"/>
+            <a:off x="7961704" y="1440849"/>
             <a:ext cx="3731873" cy="2685326"/>
           </a:xfrm>
           <a:prstGeom prst="rect">
@@ -21945,28 +21948,26 @@
       </p:pic>
       <p:pic>
         <p:nvPicPr>
-          <p:cNvPr id="3" name="Imagen 2">
-            <a:extLst>
-              <a:ext uri="{FF2B5EF4-FFF2-40B4-BE49-F238E27FC236}">
-                <a16:creationId xmlns:a16="http://schemas.microsoft.com/office/drawing/2014/main" id="{B78FAD9C-72AB-48A3-8B70-AA06CD16F9B1}"/>
-              </a:ext>
-            </a:extLst>
-          </p:cNvPr>
-          <p:cNvPicPr>
-            <a:picLocks noChangeAspect="1"/>
-          </p:cNvPicPr>
+          <p:cNvPr id="7" name="Imagen 6"/>
+          <p:cNvPicPr/>
           <p:nvPr/>
         </p:nvPicPr>
         <p:blipFill>
-          <a:blip r:embed="rId5"/>
+          <a:blip r:embed="rId5">
+            <a:extLst>
+              <a:ext uri="{28A0092B-C50C-407E-A947-70E740481C1C}">
+                <a14:useLocalDpi xmlns:a14="http://schemas.microsoft.com/office/drawing/2010/main" val="0"/>
+              </a:ext>
+            </a:extLst>
+          </a:blip>
           <a:stretch>
             <a:fillRect/>
           </a:stretch>
         </p:blipFill>
         <p:spPr>
           <a:xfrm>
-            <a:off x="1116307" y="1510797"/>
-            <a:ext cx="5353193" cy="2724081"/>
+            <a:off x="343949" y="1053979"/>
+            <a:ext cx="6750533" cy="3243579"/>
           </a:xfrm>
           <a:prstGeom prst="rect">
             <a:avLst/>

</xml_diff>